<commit_message>
more updates, fonts and sizes mainly
</commit_message>
<xml_diff>
--- a/Zoncon-2017-Sai-Pc-ZCSlides.pptx
+++ b/Zoncon-2017-Sai-Pc-ZCSlides.pptx
@@ -5428,12 +5428,16 @@
           <a:p>
             <a:r>
               <a:rPr lang="en-US" altLang="en-US" dirty="0" smtClean="0">
-                <a:ea typeface="MS PGothic" charset="-128"/>
+                <a:latin typeface="Gill Sans MT" charset="0"/>
+                <a:ea typeface="Gill Sans MT" charset="0"/>
+                <a:cs typeface="Gill Sans MT" charset="0"/>
               </a:rPr>
               <a:t>Mitigation Strategies</a:t>
             </a:r>
             <a:endParaRPr lang="en-US" altLang="en-US" dirty="0">
-              <a:ea typeface="MS PGothic" charset="-128"/>
+              <a:latin typeface="Gill Sans MT" charset="0"/>
+              <a:ea typeface="Gill Sans MT" charset="0"/>
+              <a:cs typeface="Gill Sans MT" charset="0"/>
             </a:endParaRPr>
           </a:p>
         </p:txBody>

</xml_diff>